<commit_message>
Adding Braille text recognition
</commit_message>
<xml_diff>
--- a/Presentation/ENVISIONAI KODIKON.pptx
+++ b/Presentation/ENVISIONAI KODIKON.pptx
@@ -5,7 +5,7 @@
     <p:sldMasterId id="2147483704" r:id="rId1"/>
   </p:sldMasterIdLst>
   <p:notesMasterIdLst>
-    <p:notesMasterId r:id="rId13"/>
+    <p:notesMasterId r:id="rId12"/>
   </p:notesMasterIdLst>
   <p:sldIdLst>
     <p:sldId id="256" r:id="rId2"/>
@@ -18,7 +18,6 @@
     <p:sldId id="351" r:id="rId9"/>
     <p:sldId id="276" r:id="rId10"/>
     <p:sldId id="352" r:id="rId11"/>
-    <p:sldId id="306" r:id="rId12"/>
   </p:sldIdLst>
   <p:sldSz cx="9144000" cy="5143500" type="screen16x9"/>
   <p:notesSz cx="6858000" cy="9144000"/>
@@ -329,8 +328,8 @@
           <pc:sldMk cId="0" sldId="259"/>
         </pc:sldMkLst>
       </pc:sldChg>
-      <pc:sldChg chg="delSp modSp add mod ord modNotes">
-        <pc:chgData name="muhammed farhan" userId="5c65b7e9cd9c76bd" providerId="LiveId" clId="{BDD5F673-6D1A-46B3-9EDD-3531F5B569C8}" dt="2023-11-04T05:16:08.043" v="1856" actId="2711"/>
+      <pc:sldChg chg="del">
+        <pc:chgData name="muhammed farhan" userId="5c65b7e9cd9c76bd" providerId="LiveId" clId="{BDD5F673-6D1A-46B3-9EDD-3531F5B569C8}" dt="2023-11-04T05:03:35.134" v="1569" actId="2696"/>
         <pc:sldMkLst>
           <pc:docMk/>
           <pc:sldMk cId="4274764795" sldId="260"/>
@@ -367,13 +366,6 @@
             <ac:spMk id="687" creationId="{00000000-0000-0000-0000-000000000000}"/>
           </ac:spMkLst>
         </pc:spChg>
-      </pc:sldChg>
-      <pc:sldChg chg="del">
-        <pc:chgData name="muhammed farhan" userId="5c65b7e9cd9c76bd" providerId="LiveId" clId="{BDD5F673-6D1A-46B3-9EDD-3531F5B569C8}" dt="2023-11-04T05:03:35.134" v="1569" actId="2696"/>
-        <pc:sldMkLst>
-          <pc:docMk/>
-          <pc:sldMk cId="4274764795" sldId="260"/>
-        </pc:sldMkLst>
       </pc:sldChg>
       <pc:sldChg chg="del modNotes">
         <pc:chgData name="muhammed farhan" userId="5c65b7e9cd9c76bd" providerId="LiveId" clId="{BDD5F673-6D1A-46B3-9EDD-3531F5B569C8}" dt="2023-11-04T05:04:57.574" v="1577" actId="2696"/>
@@ -2829,110 +2821,6 @@
 </p:notes>
 </file>
 
-<file path=ppt/notesSlides/notesSlide9.xml><?xml version="1.0" encoding="utf-8"?>
-<p:notes xmlns:a="http://schemas.openxmlformats.org/drawingml/2006/main" xmlns:r="http://schemas.openxmlformats.org/officeDocument/2006/relationships" xmlns:p="http://schemas.openxmlformats.org/presentationml/2006/main" showMasterSp="0" showMasterPhAnim="0">
-  <p:cSld>
-    <p:spTree>
-      <p:nvGrpSpPr>
-        <p:cNvPr id="1" name="Shape 3623"/>
-        <p:cNvGrpSpPr/>
-        <p:nvPr/>
-      </p:nvGrpSpPr>
-      <p:grpSpPr>
-        <a:xfrm>
-          <a:off x="0" y="0"/>
-          <a:ext cx="0" cy="0"/>
-          <a:chOff x="0" y="0"/>
-          <a:chExt cx="0" cy="0"/>
-        </a:xfrm>
-      </p:grpSpPr>
-      <p:sp>
-        <p:nvSpPr>
-          <p:cNvPr id="3624" name="Google Shape;3624;g138212783df_0_1802:notes"/>
-          <p:cNvSpPr>
-            <a:spLocks noGrp="1" noRot="1" noChangeAspect="1"/>
-          </p:cNvSpPr>
-          <p:nvPr>
-            <p:ph type="sldImg" idx="2"/>
-          </p:nvPr>
-        </p:nvSpPr>
-        <p:spPr>
-          <a:xfrm>
-            <a:off x="381000" y="685800"/>
-            <a:ext cx="6096000" cy="3429000"/>
-          </a:xfrm>
-          <a:custGeom>
-            <a:avLst/>
-            <a:gdLst/>
-            <a:ahLst/>
-            <a:cxnLst/>
-            <a:rect l="l" t="t" r="r" b="b"/>
-            <a:pathLst>
-              <a:path w="120000" h="120000" extrusionOk="0">
-                <a:moveTo>
-                  <a:pt x="0" y="0"/>
-                </a:moveTo>
-                <a:lnTo>
-                  <a:pt x="120000" y="0"/>
-                </a:lnTo>
-                <a:lnTo>
-                  <a:pt x="120000" y="120000"/>
-                </a:lnTo>
-                <a:lnTo>
-                  <a:pt x="0" y="120000"/>
-                </a:lnTo>
-                <a:close/>
-              </a:path>
-            </a:pathLst>
-          </a:custGeom>
-        </p:spPr>
-      </p:sp>
-      <p:sp>
-        <p:nvSpPr>
-          <p:cNvPr id="3625" name="Google Shape;3625;g138212783df_0_1802:notes"/>
-          <p:cNvSpPr txBox="1">
-            <a:spLocks noGrp="1"/>
-          </p:cNvSpPr>
-          <p:nvPr>
-            <p:ph type="body" idx="1"/>
-          </p:nvPr>
-        </p:nvSpPr>
-        <p:spPr>
-          <a:xfrm>
-            <a:off x="685800" y="4343400"/>
-            <a:ext cx="5486400" cy="4114800"/>
-          </a:xfrm>
-          <a:prstGeom prst="rect">
-            <a:avLst/>
-          </a:prstGeom>
-        </p:spPr>
-        <p:txBody>
-          <a:bodyPr spcFirstLastPara="1" wrap="square" lIns="91425" tIns="91425" rIns="91425" bIns="91425" anchor="t" anchorCtr="0">
-            <a:noAutofit/>
-          </a:bodyPr>
-          <a:lstStyle/>
-          <a:p>
-            <a:pPr marL="0" lvl="0" indent="0" algn="l" rtl="0">
-              <a:spcBef>
-                <a:spcPts val="0"/>
-              </a:spcBef>
-              <a:spcAft>
-                <a:spcPts val="0"/>
-              </a:spcAft>
-              <a:buNone/>
-            </a:pPr>
-            <a:endParaRPr/>
-          </a:p>
-        </p:txBody>
-      </p:sp>
-    </p:spTree>
-  </p:cSld>
-  <p:clrMapOvr>
-    <a:masterClrMapping/>
-  </p:clrMapOvr>
-</p:notes>
-</file>
-
 <file path=ppt/slideLayouts/slideLayout1.xml><?xml version="1.0" encoding="utf-8"?>
 <p:sldLayout xmlns:a="http://schemas.openxmlformats.org/drawingml/2006/main" xmlns:r="http://schemas.openxmlformats.org/officeDocument/2006/relationships" xmlns:p="http://schemas.openxmlformats.org/presentationml/2006/main" matchingName="Title slide" type="title">
   <p:cSld name="TITLE">
@@ -3316,98 +3204,6 @@
 </file>
 
 <file path=ppt/slideLayouts/slideLayout10.xml><?xml version="1.0" encoding="utf-8"?>
-<p:sldLayout xmlns:a="http://schemas.openxmlformats.org/drawingml/2006/main" xmlns:r="http://schemas.openxmlformats.org/officeDocument/2006/relationships" xmlns:p="http://schemas.openxmlformats.org/presentationml/2006/main" matchingName="Background 3">
-  <p:cSld name="CUSTOM_9_1_1_1">
-    <p:bg>
-      <p:bgPr>
-        <a:blipFill>
-          <a:blip r:embed="rId2">
-            <a:alphaModFix/>
-          </a:blip>
-          <a:stretch>
-            <a:fillRect/>
-          </a:stretch>
-        </a:blipFill>
-        <a:effectLst/>
-      </p:bgPr>
-    </p:bg>
-    <p:spTree>
-      <p:nvGrpSpPr>
-        <p:cNvPr id="1" name="Shape 573"/>
-        <p:cNvGrpSpPr/>
-        <p:nvPr/>
-      </p:nvGrpSpPr>
-      <p:grpSpPr>
-        <a:xfrm>
-          <a:off x="0" y="0"/>
-          <a:ext cx="0" cy="0"/>
-          <a:chOff x="0" y="0"/>
-          <a:chExt cx="0" cy="0"/>
-        </a:xfrm>
-      </p:grpSpPr>
-      <p:pic>
-        <p:nvPicPr>
-          <p:cNvPr id="574" name="Google Shape;574;p55"/>
-          <p:cNvPicPr preferRelativeResize="0"/>
-          <p:nvPr/>
-        </p:nvPicPr>
-        <p:blipFill rotWithShape="1">
-          <a:blip r:embed="rId3">
-            <a:alphaModFix/>
-          </a:blip>
-          <a:srcRect b="47712"/>
-          <a:stretch/>
-        </p:blipFill>
-        <p:spPr>
-          <a:xfrm>
-            <a:off x="3489225" y="4122300"/>
-            <a:ext cx="3222850" cy="1021225"/>
-          </a:xfrm>
-          <a:prstGeom prst="rect">
-            <a:avLst/>
-          </a:prstGeom>
-          <a:noFill/>
-          <a:ln>
-            <a:noFill/>
-          </a:ln>
-        </p:spPr>
-      </p:pic>
-      <p:pic>
-        <p:nvPicPr>
-          <p:cNvPr id="575" name="Google Shape;575;p55"/>
-          <p:cNvPicPr preferRelativeResize="0"/>
-          <p:nvPr/>
-        </p:nvPicPr>
-        <p:blipFill rotWithShape="1">
-          <a:blip r:embed="rId3">
-            <a:alphaModFix/>
-          </a:blip>
-          <a:srcRect t="47712"/>
-          <a:stretch/>
-        </p:blipFill>
-        <p:spPr>
-          <a:xfrm>
-            <a:off x="5977075" y="0"/>
-            <a:ext cx="3222850" cy="1021225"/>
-          </a:xfrm>
-          <a:prstGeom prst="rect">
-            <a:avLst/>
-          </a:prstGeom>
-          <a:noFill/>
-          <a:ln>
-            <a:noFill/>
-          </a:ln>
-        </p:spPr>
-      </p:pic>
-    </p:spTree>
-  </p:cSld>
-  <p:clrMapOvr>
-    <a:masterClrMapping/>
-  </p:clrMapOvr>
-</p:sldLayout>
-</file>
-
-<file path=ppt/slideLayouts/slideLayout11.xml><?xml version="1.0" encoding="utf-8"?>
 <p:sldLayout xmlns:a="http://schemas.openxmlformats.org/drawingml/2006/main" xmlns:r="http://schemas.openxmlformats.org/officeDocument/2006/relationships" xmlns:p="http://schemas.openxmlformats.org/presentationml/2006/main" matchingName="Section title and description">
   <p:cSld name="Section title and description">
     <p:bg>
@@ -6520,164 +6316,6 @@
 </file>
 
 <file path=ppt/slideLayouts/slideLayout6.xml><?xml version="1.0" encoding="utf-8"?>
-<p:sldLayout xmlns:a="http://schemas.openxmlformats.org/drawingml/2006/main" xmlns:r="http://schemas.openxmlformats.org/officeDocument/2006/relationships" xmlns:p="http://schemas.openxmlformats.org/presentationml/2006/main" matchingName="Caption 1">
-  <p:cSld name="CAPTION_ONLY_1">
-    <p:spTree>
-      <p:nvGrpSpPr>
-        <p:cNvPr id="1" name="Shape 489"/>
-        <p:cNvGrpSpPr/>
-        <p:nvPr/>
-      </p:nvGrpSpPr>
-      <p:grpSpPr>
-        <a:xfrm>
-          <a:off x="0" y="0"/>
-          <a:ext cx="0" cy="0"/>
-          <a:chOff x="0" y="0"/>
-          <a:chExt cx="0" cy="0"/>
-        </a:xfrm>
-      </p:grpSpPr>
-      <p:sp>
-        <p:nvSpPr>
-          <p:cNvPr id="490" name="Google Shape;490;p45"/>
-          <p:cNvSpPr txBox="1">
-            <a:spLocks noGrp="1"/>
-          </p:cNvSpPr>
-          <p:nvPr>
-            <p:ph type="title"/>
-          </p:nvPr>
-        </p:nvSpPr>
-        <p:spPr>
-          <a:xfrm>
-            <a:off x="510025" y="459300"/>
-            <a:ext cx="3556800" cy="1108200"/>
-          </a:xfrm>
-          <a:prstGeom prst="rect">
-            <a:avLst/>
-          </a:prstGeom>
-        </p:spPr>
-        <p:txBody>
-          <a:bodyPr spcFirstLastPara="1" wrap="square" lIns="91425" tIns="91425" rIns="91425" bIns="91425" anchor="t" anchorCtr="0">
-            <a:noAutofit/>
-          </a:bodyPr>
-          <a:lstStyle>
-            <a:lvl1pPr lvl="0" rtl="0">
-              <a:spcBef>
-                <a:spcPts val="0"/>
-              </a:spcBef>
-              <a:spcAft>
-                <a:spcPts val="0"/>
-              </a:spcAft>
-              <a:buSzPts val="3500"/>
-              <a:buNone/>
-              <a:defRPr sz="3000">
-                <a:solidFill>
-                  <a:schemeClr val="accent1"/>
-                </a:solidFill>
-              </a:defRPr>
-            </a:lvl1pPr>
-            <a:lvl2pPr lvl="1" algn="ctr" rtl="0">
-              <a:spcBef>
-                <a:spcPts val="0"/>
-              </a:spcBef>
-              <a:spcAft>
-                <a:spcPts val="0"/>
-              </a:spcAft>
-              <a:buSzPts val="3500"/>
-              <a:buNone/>
-              <a:defRPr/>
-            </a:lvl2pPr>
-            <a:lvl3pPr lvl="2" algn="ctr" rtl="0">
-              <a:spcBef>
-                <a:spcPts val="0"/>
-              </a:spcBef>
-              <a:spcAft>
-                <a:spcPts val="0"/>
-              </a:spcAft>
-              <a:buSzPts val="3500"/>
-              <a:buNone/>
-              <a:defRPr/>
-            </a:lvl3pPr>
-            <a:lvl4pPr lvl="3" algn="ctr" rtl="0">
-              <a:spcBef>
-                <a:spcPts val="0"/>
-              </a:spcBef>
-              <a:spcAft>
-                <a:spcPts val="0"/>
-              </a:spcAft>
-              <a:buSzPts val="3500"/>
-              <a:buNone/>
-              <a:defRPr/>
-            </a:lvl4pPr>
-            <a:lvl5pPr lvl="4" algn="ctr" rtl="0">
-              <a:spcBef>
-                <a:spcPts val="0"/>
-              </a:spcBef>
-              <a:spcAft>
-                <a:spcPts val="0"/>
-              </a:spcAft>
-              <a:buSzPts val="3500"/>
-              <a:buNone/>
-              <a:defRPr/>
-            </a:lvl5pPr>
-            <a:lvl6pPr lvl="5" algn="ctr" rtl="0">
-              <a:spcBef>
-                <a:spcPts val="0"/>
-              </a:spcBef>
-              <a:spcAft>
-                <a:spcPts val="0"/>
-              </a:spcAft>
-              <a:buSzPts val="3500"/>
-              <a:buNone/>
-              <a:defRPr/>
-            </a:lvl6pPr>
-            <a:lvl7pPr lvl="6" algn="ctr" rtl="0">
-              <a:spcBef>
-                <a:spcPts val="0"/>
-              </a:spcBef>
-              <a:spcAft>
-                <a:spcPts val="0"/>
-              </a:spcAft>
-              <a:buSzPts val="3500"/>
-              <a:buNone/>
-              <a:defRPr/>
-            </a:lvl7pPr>
-            <a:lvl8pPr lvl="7" algn="ctr" rtl="0">
-              <a:spcBef>
-                <a:spcPts val="0"/>
-              </a:spcBef>
-              <a:spcAft>
-                <a:spcPts val="0"/>
-              </a:spcAft>
-              <a:buSzPts val="3500"/>
-              <a:buNone/>
-              <a:defRPr/>
-            </a:lvl8pPr>
-            <a:lvl9pPr lvl="8" algn="ctr" rtl="0">
-              <a:spcBef>
-                <a:spcPts val="0"/>
-              </a:spcBef>
-              <a:spcAft>
-                <a:spcPts val="0"/>
-              </a:spcAft>
-              <a:buSzPts val="3500"/>
-              <a:buNone/>
-              <a:defRPr/>
-            </a:lvl9pPr>
-          </a:lstStyle>
-          <a:p>
-            <a:endParaRPr/>
-          </a:p>
-        </p:txBody>
-      </p:sp>
-    </p:spTree>
-  </p:cSld>
-  <p:clrMapOvr>
-    <a:masterClrMapping/>
-  </p:clrMapOvr>
-</p:sldLayout>
-</file>
-
-<file path=ppt/slideLayouts/slideLayout7.xml><?xml version="1.0" encoding="utf-8"?>
 <p:sldLayout xmlns:a="http://schemas.openxmlformats.org/drawingml/2006/main" xmlns:r="http://schemas.openxmlformats.org/officeDocument/2006/relationships" xmlns:p="http://schemas.openxmlformats.org/presentationml/2006/main" matchingName="Background">
   <p:cSld name="CUSTOM_9">
     <p:bg>
@@ -6970,7 +6608,7 @@
 </p:sldLayout>
 </file>
 
-<file path=ppt/slideLayouts/slideLayout8.xml><?xml version="1.0" encoding="utf-8"?>
+<file path=ppt/slideLayouts/slideLayout7.xml><?xml version="1.0" encoding="utf-8"?>
 <p:sldLayout xmlns:a="http://schemas.openxmlformats.org/drawingml/2006/main" xmlns:r="http://schemas.openxmlformats.org/officeDocument/2006/relationships" xmlns:p="http://schemas.openxmlformats.org/presentationml/2006/main" matchingName="Background 1">
   <p:cSld name="CUSTOM_9_1">
     <p:bg>
@@ -7274,7 +6912,7 @@
 </p:sldLayout>
 </file>
 
-<file path=ppt/slideLayouts/slideLayout9.xml><?xml version="1.0" encoding="utf-8"?>
+<file path=ppt/slideLayouts/slideLayout8.xml><?xml version="1.0" encoding="utf-8"?>
 <p:sldLayout xmlns:a="http://schemas.openxmlformats.org/drawingml/2006/main" xmlns:r="http://schemas.openxmlformats.org/officeDocument/2006/relationships" xmlns:p="http://schemas.openxmlformats.org/presentationml/2006/main" matchingName="Background 2">
   <p:cSld name="CUSTOM_9_1_1">
     <p:bg>
@@ -7861,6 +7499,98 @@
 </p:sldLayout>
 </file>
 
+<file path=ppt/slideLayouts/slideLayout9.xml><?xml version="1.0" encoding="utf-8"?>
+<p:sldLayout xmlns:a="http://schemas.openxmlformats.org/drawingml/2006/main" xmlns:r="http://schemas.openxmlformats.org/officeDocument/2006/relationships" xmlns:p="http://schemas.openxmlformats.org/presentationml/2006/main" matchingName="Background 3">
+  <p:cSld name="CUSTOM_9_1_1_1">
+    <p:bg>
+      <p:bgPr>
+        <a:blipFill>
+          <a:blip r:embed="rId2">
+            <a:alphaModFix/>
+          </a:blip>
+          <a:stretch>
+            <a:fillRect/>
+          </a:stretch>
+        </a:blipFill>
+        <a:effectLst/>
+      </p:bgPr>
+    </p:bg>
+    <p:spTree>
+      <p:nvGrpSpPr>
+        <p:cNvPr id="1" name="Shape 573"/>
+        <p:cNvGrpSpPr/>
+        <p:nvPr/>
+      </p:nvGrpSpPr>
+      <p:grpSpPr>
+        <a:xfrm>
+          <a:off x="0" y="0"/>
+          <a:ext cx="0" cy="0"/>
+          <a:chOff x="0" y="0"/>
+          <a:chExt cx="0" cy="0"/>
+        </a:xfrm>
+      </p:grpSpPr>
+      <p:pic>
+        <p:nvPicPr>
+          <p:cNvPr id="574" name="Google Shape;574;p55"/>
+          <p:cNvPicPr preferRelativeResize="0"/>
+          <p:nvPr/>
+        </p:nvPicPr>
+        <p:blipFill rotWithShape="1">
+          <a:blip r:embed="rId3">
+            <a:alphaModFix/>
+          </a:blip>
+          <a:srcRect b="47712"/>
+          <a:stretch/>
+        </p:blipFill>
+        <p:spPr>
+          <a:xfrm>
+            <a:off x="3489225" y="4122300"/>
+            <a:ext cx="3222850" cy="1021225"/>
+          </a:xfrm>
+          <a:prstGeom prst="rect">
+            <a:avLst/>
+          </a:prstGeom>
+          <a:noFill/>
+          <a:ln>
+            <a:noFill/>
+          </a:ln>
+        </p:spPr>
+      </p:pic>
+      <p:pic>
+        <p:nvPicPr>
+          <p:cNvPr id="575" name="Google Shape;575;p55"/>
+          <p:cNvPicPr preferRelativeResize="0"/>
+          <p:nvPr/>
+        </p:nvPicPr>
+        <p:blipFill rotWithShape="1">
+          <a:blip r:embed="rId3">
+            <a:alphaModFix/>
+          </a:blip>
+          <a:srcRect t="47712"/>
+          <a:stretch/>
+        </p:blipFill>
+        <p:spPr>
+          <a:xfrm>
+            <a:off x="5977075" y="0"/>
+            <a:ext cx="3222850" cy="1021225"/>
+          </a:xfrm>
+          <a:prstGeom prst="rect">
+            <a:avLst/>
+          </a:prstGeom>
+          <a:noFill/>
+          <a:ln>
+            <a:noFill/>
+          </a:ln>
+        </p:spPr>
+      </p:pic>
+    </p:spTree>
+  </p:cSld>
+  <p:clrMapOvr>
+    <a:masterClrMapping/>
+  </p:clrMapOvr>
+</p:sldLayout>
+</file>
+
 <file path=ppt/slideMasters/slideMaster1.xml><?xml version="1.0" encoding="utf-8"?>
 <p:sldMaster xmlns:a="http://schemas.openxmlformats.org/drawingml/2006/main" xmlns:r="http://schemas.openxmlformats.org/officeDocument/2006/relationships" xmlns:p="http://schemas.openxmlformats.org/presentationml/2006/main">
   <p:cSld name="simple-light-2">
@@ -8404,12 +8134,11 @@
     <p:sldLayoutId id="2147483658" r:id="rId3"/>
     <p:sldLayoutId id="2147483665" r:id="rId4"/>
     <p:sldLayoutId id="2147483686" r:id="rId5"/>
-    <p:sldLayoutId id="2147483691" r:id="rId6"/>
-    <p:sldLayoutId id="2147483698" r:id="rId7"/>
-    <p:sldLayoutId id="2147483699" r:id="rId8"/>
-    <p:sldLayoutId id="2147483700" r:id="rId9"/>
-    <p:sldLayoutId id="2147483701" r:id="rId10"/>
-    <p:sldLayoutId id="2147483706" r:id="rId11"/>
+    <p:sldLayoutId id="2147483698" r:id="rId6"/>
+    <p:sldLayoutId id="2147483699" r:id="rId7"/>
+    <p:sldLayoutId id="2147483700" r:id="rId8"/>
+    <p:sldLayoutId id="2147483701" r:id="rId9"/>
+    <p:sldLayoutId id="2147483706" r:id="rId10"/>
   </p:sldLayoutIdLst>
   <p:hf hdr="0" ftr="0" dt="0"/>
   <p:txStyles>
@@ -10508,256 +10237,6 @@
 </p:sld>
 </file>
 
-<file path=ppt/slides/slide11.xml><?xml version="1.0" encoding="utf-8"?>
-<p:sld xmlns:a="http://schemas.openxmlformats.org/drawingml/2006/main" xmlns:r="http://schemas.openxmlformats.org/officeDocument/2006/relationships" xmlns:p="http://schemas.openxmlformats.org/presentationml/2006/main">
-  <p:cSld>
-    <p:bg>
-      <p:bgPr>
-        <a:blipFill>
-          <a:blip r:embed="rId3">
-            <a:alphaModFix/>
-          </a:blip>
-          <a:stretch>
-            <a:fillRect/>
-          </a:stretch>
-        </a:blipFill>
-        <a:effectLst/>
-      </p:bgPr>
-    </p:bg>
-    <p:spTree>
-      <p:nvGrpSpPr>
-        <p:cNvPr id="1" name="Shape 3626"/>
-        <p:cNvGrpSpPr/>
-        <p:nvPr/>
-      </p:nvGrpSpPr>
-      <p:grpSpPr>
-        <a:xfrm>
-          <a:off x="0" y="0"/>
-          <a:ext cx="0" cy="0"/>
-          <a:chOff x="0" y="0"/>
-          <a:chExt cx="0" cy="0"/>
-        </a:xfrm>
-      </p:grpSpPr>
-      <p:grpSp>
-        <p:nvGrpSpPr>
-          <p:cNvPr id="3627" name="Google Shape;3627;p109"/>
-          <p:cNvGrpSpPr/>
-          <p:nvPr/>
-        </p:nvGrpSpPr>
-        <p:grpSpPr>
-          <a:xfrm flipV="1">
-            <a:off x="4324386" y="1829035"/>
-            <a:ext cx="45719" cy="51803"/>
-            <a:chOff x="713100" y="1597775"/>
-            <a:chExt cx="5712625" cy="3217500"/>
-          </a:xfrm>
-        </p:grpSpPr>
-        <p:sp>
-          <p:nvSpPr>
-            <p:cNvPr id="3628" name="Google Shape;3628;p109"/>
-            <p:cNvSpPr/>
-            <p:nvPr/>
-          </p:nvSpPr>
-          <p:spPr>
-            <a:xfrm>
-              <a:off x="713100" y="1597775"/>
-              <a:ext cx="5574000" cy="3078900"/>
-            </a:xfrm>
-            <a:prstGeom prst="snip2DiagRect">
-              <a:avLst>
-                <a:gd name="adj1" fmla="val 0"/>
-                <a:gd name="adj2" fmla="val 16667"/>
-              </a:avLst>
-            </a:prstGeom>
-            <a:solidFill>
-              <a:srgbClr val="FFFFFF">
-                <a:alpha val="43450"/>
-              </a:srgbClr>
-            </a:solidFill>
-            <a:ln>
-              <a:noFill/>
-            </a:ln>
-          </p:spPr>
-          <p:txBody>
-            <a:bodyPr spcFirstLastPara="1" wrap="square" lIns="91425" tIns="91425" rIns="91425" bIns="91425" anchor="ctr" anchorCtr="0">
-              <a:noAutofit/>
-            </a:bodyPr>
-            <a:lstStyle/>
-            <a:p>
-              <a:pPr marL="0" lvl="0" indent="0" algn="l" rtl="0">
-                <a:spcBef>
-                  <a:spcPts val="0"/>
-                </a:spcBef>
-                <a:spcAft>
-                  <a:spcPts val="0"/>
-                </a:spcAft>
-                <a:buNone/>
-              </a:pPr>
-              <a:endParaRPr/>
-            </a:p>
-          </p:txBody>
-        </p:sp>
-        <p:sp>
-          <p:nvSpPr>
-            <p:cNvPr id="3629" name="Google Shape;3629;p109"/>
-            <p:cNvSpPr/>
-            <p:nvPr/>
-          </p:nvSpPr>
-          <p:spPr>
-            <a:xfrm>
-              <a:off x="851725" y="1736375"/>
-              <a:ext cx="5574000" cy="3078900"/>
-            </a:xfrm>
-            <a:prstGeom prst="snip2DiagRect">
-              <a:avLst>
-                <a:gd name="adj1" fmla="val 0"/>
-                <a:gd name="adj2" fmla="val 16667"/>
-              </a:avLst>
-            </a:prstGeom>
-            <a:noFill/>
-            <a:ln w="9525" cap="flat" cmpd="sng">
-              <a:solidFill>
-                <a:schemeClr val="accent1"/>
-              </a:solidFill>
-              <a:prstDash val="solid"/>
-              <a:round/>
-              <a:headEnd type="none" w="sm" len="sm"/>
-              <a:tailEnd type="none" w="sm" len="sm"/>
-            </a:ln>
-            <a:effectLst>
-              <a:outerShdw blurRad="100013" algn="bl" rotWithShape="0">
-                <a:schemeClr val="lt1">
-                  <a:alpha val="70000"/>
-                </a:schemeClr>
-              </a:outerShdw>
-            </a:effectLst>
-          </p:spPr>
-          <p:txBody>
-            <a:bodyPr spcFirstLastPara="1" wrap="square" lIns="91425" tIns="91425" rIns="91425" bIns="91425" anchor="ctr" anchorCtr="0">
-              <a:noAutofit/>
-            </a:bodyPr>
-            <a:lstStyle/>
-            <a:p>
-              <a:pPr marL="0" lvl="0" indent="0" algn="l" rtl="0">
-                <a:spcBef>
-                  <a:spcPts val="0"/>
-                </a:spcBef>
-                <a:spcAft>
-                  <a:spcPts val="0"/>
-                </a:spcAft>
-                <a:buNone/>
-              </a:pPr>
-              <a:endParaRPr/>
-            </a:p>
-          </p:txBody>
-        </p:sp>
-      </p:grpSp>
-    </p:spTree>
-  </p:cSld>
-  <p:clrMapOvr>
-    <a:masterClrMapping/>
-  </p:clrMapOvr>
-  <p:timing>
-    <p:tnLst>
-      <p:par>
-        <p:cTn id="1" dur="indefinite" restart="never" nodeType="tmRoot">
-          <p:childTnLst>
-            <p:seq concurrent="1" nextAc="seek">
-              <p:cTn id="2" dur="indefinite" nodeType="mainSeq">
-                <p:childTnLst>
-                  <p:par>
-                    <p:cTn id="3" fill="hold">
-                      <p:stCondLst>
-                        <p:cond delay="indefinite"/>
-                      </p:stCondLst>
-                      <p:childTnLst>
-                        <p:par>
-                          <p:cTn id="4" fill="hold">
-                            <p:stCondLst>
-                              <p:cond delay="0"/>
-                            </p:stCondLst>
-                            <p:childTnLst>
-                              <p:par>
-                                <p:cTn id="5" presetID="2" presetClass="entr" presetSubtype="1" fill="hold" nodeType="clickEffect">
-                                  <p:stCondLst>
-                                    <p:cond delay="0"/>
-                                  </p:stCondLst>
-                                  <p:childTnLst>
-                                    <p:set>
-                                      <p:cBhvr>
-                                        <p:cTn id="6" dur="1" fill="hold">
-                                          <p:stCondLst>
-                                            <p:cond delay="0"/>
-                                          </p:stCondLst>
-                                        </p:cTn>
-                                        <p:tgtEl>
-                                          <p:spTgt spid="3627"/>
-                                        </p:tgtEl>
-                                        <p:attrNameLst>
-                                          <p:attrName>style.visibility</p:attrName>
-                                        </p:attrNameLst>
-                                      </p:cBhvr>
-                                      <p:to>
-                                        <p:strVal val="visible"/>
-                                      </p:to>
-                                    </p:set>
-                                    <p:anim calcmode="lin" valueType="num">
-                                      <p:cBhvr additive="base">
-                                        <p:cTn id="7" dur="1000"/>
-                                        <p:tgtEl>
-                                          <p:spTgt spid="3627"/>
-                                        </p:tgtEl>
-                                        <p:attrNameLst>
-                                          <p:attrName>ppt_y</p:attrName>
-                                        </p:attrNameLst>
-                                      </p:cBhvr>
-                                      <p:tavLst>
-                                        <p:tav tm="0">
-                                          <p:val>
-                                            <p:strVal val="#ppt_y-1"/>
-                                          </p:val>
-                                        </p:tav>
-                                        <p:tav tm="100000">
-                                          <p:val>
-                                            <p:strVal val="#ppt_y"/>
-                                          </p:val>
-                                        </p:tav>
-                                      </p:tavLst>
-                                    </p:anim>
-                                  </p:childTnLst>
-                                </p:cTn>
-                              </p:par>
-                            </p:childTnLst>
-                          </p:cTn>
-                        </p:par>
-                      </p:childTnLst>
-                    </p:cTn>
-                  </p:par>
-                </p:childTnLst>
-              </p:cTn>
-              <p:prevCondLst>
-                <p:cond evt="onPrev" delay="0">
-                  <p:tgtEl>
-                    <p:sldTgt/>
-                  </p:tgtEl>
-                </p:cond>
-              </p:prevCondLst>
-              <p:nextCondLst>
-                <p:cond evt="onNext" delay="0">
-                  <p:tgtEl>
-                    <p:sldTgt/>
-                  </p:tgtEl>
-                </p:cond>
-              </p:nextCondLst>
-            </p:seq>
-          </p:childTnLst>
-        </p:cTn>
-      </p:par>
-    </p:tnLst>
-  </p:timing>
-</p:sld>
-</file>
-
 <file path=ppt/slides/slide2.xml><?xml version="1.0" encoding="utf-8"?>
 <p:sld xmlns:a="http://schemas.openxmlformats.org/drawingml/2006/main" xmlns:r="http://schemas.openxmlformats.org/officeDocument/2006/relationships" xmlns:p="http://schemas.openxmlformats.org/presentationml/2006/main">
   <p:cSld>
@@ -11292,13 +10771,22 @@
           <a:lstStyle/>
           <a:p>
             <a:r>
+              <a:rPr lang="en-IN" sz="2000" b="1" dirty="0">
+                <a:solidFill>
+                  <a:srgbClr val="00D4FF"/>
+                </a:solidFill>
+                <a:latin typeface="IBM Plex Sans" panose="020B0503050203000203" pitchFamily="34" charset="0"/>
+              </a:rPr>
+              <a:t>  </a:t>
+            </a:r>
+            <a:r>
               <a:rPr lang="en-IN" sz="2000" b="1" u="sng" dirty="0">
                 <a:solidFill>
                   <a:srgbClr val="00D4FF"/>
                 </a:solidFill>
                 <a:latin typeface="IBM Plex Sans" panose="020B0503050203000203" pitchFamily="34" charset="0"/>
               </a:rPr>
-              <a:t>ARTIFICIAL INTELLIGENCE SPECTACULAR GLASS</a:t>
+              <a:t>ARTIFICIAL INTELLIGENCE SPECTACULAR GLASS </a:t>
             </a:r>
           </a:p>
         </p:txBody>
@@ -11340,8 +10828,8 @@
         </p:nvSpPr>
         <p:spPr>
           <a:xfrm>
-            <a:off x="720000" y="572429"/>
-            <a:ext cx="7704000" cy="4059722"/>
+            <a:off x="720000" y="1248937"/>
+            <a:ext cx="7704000" cy="3383214"/>
           </a:xfrm>
           <a:prstGeom prst="rect">
             <a:avLst/>
@@ -11365,7 +10853,15 @@
             </a:pPr>
             <a:r>
               <a:rPr lang="en-IN" sz="1400" dirty="0"/>
-              <a:t>People who are affected by the problem are the visually-disabled people.</a:t>
+              <a:t>People who are affected by the problem are </a:t>
+            </a:r>
+            <a:r>
+              <a:rPr lang="en-IN" sz="1400"/>
+              <a:t>the visually-impaired </a:t>
+            </a:r>
+            <a:r>
+              <a:rPr lang="en-IN" sz="1400" dirty="0"/>
+              <a:t>people.</a:t>
             </a:r>
           </a:p>
           <a:p>

</xml_diff>